<commit_message>
adição do penis gigantesco
</commit_message>
<xml_diff>
--- a/Documentacao/FIAP-QualidProjSW-Aula-1-Introducao Qualidade - EXERCICIOS.pptx
+++ b/Documentacao/FIAP-QualidProjSW-Aula-1-Introducao Qualidade - EXERCICIOS.pptx
@@ -217,7 +217,7 @@
           <a:p>
             <a:fld id="{B6D4C934-FEA0-426E-B081-61FE807EA637}" type="datetimeFigureOut">
               <a:rPr lang="pt-BR" smtClean="0"/>
-              <a:t>22/01/2020</a:t>
+              <a:t>05/03/2020</a:t>
             </a:fld>
             <a:endParaRPr lang="pt-BR"/>
           </a:p>
@@ -375,7 +375,7 @@
           <a:p>
             <a:fld id="{F69DE88B-C5FB-4190-8CD8-D803F1201C56}" type="slidenum">
               <a:rPr lang="pt-BR" smtClean="0"/>
-              <a:t>‹nº›</a:t>
+              <a:t>‹#›</a:t>
             </a:fld>
             <a:endParaRPr lang="pt-BR"/>
           </a:p>
@@ -1441,7 +1441,7 @@
           <a:p>
             <a:fld id="{89C4B140-6DEB-45EB-A5FE-2FE213A19AB6}" type="datetimeFigureOut">
               <a:rPr lang="pt-BR" smtClean="0"/>
-              <a:t>22/01/2020</a:t>
+              <a:t>05/03/2020</a:t>
             </a:fld>
             <a:endParaRPr lang="pt-BR"/>
           </a:p>
@@ -1499,7 +1499,7 @@
           <a:p>
             <a:fld id="{1BC5D9AF-0A3A-46C6-9823-3468E6F7B9BB}" type="slidenum">
               <a:rPr lang="pt-BR" smtClean="0"/>
-              <a:t>‹nº›</a:t>
+              <a:t>‹#›</a:t>
             </a:fld>
             <a:endParaRPr lang="pt-BR"/>
           </a:p>
@@ -1649,7 +1649,7 @@
           <a:p>
             <a:fld id="{89C4B140-6DEB-45EB-A5FE-2FE213A19AB6}" type="datetimeFigureOut">
               <a:rPr lang="pt-BR" smtClean="0"/>
-              <a:t>22/01/2020</a:t>
+              <a:t>05/03/2020</a:t>
             </a:fld>
             <a:endParaRPr lang="pt-BR"/>
           </a:p>
@@ -1707,7 +1707,7 @@
           <a:p>
             <a:fld id="{1BC5D9AF-0A3A-46C6-9823-3468E6F7B9BB}" type="slidenum">
               <a:rPr lang="pt-BR" smtClean="0"/>
-              <a:t>‹nº›</a:t>
+              <a:t>‹#›</a:t>
             </a:fld>
             <a:endParaRPr lang="pt-BR"/>
           </a:p>
@@ -1857,7 +1857,7 @@
           <a:p>
             <a:fld id="{89C4B140-6DEB-45EB-A5FE-2FE213A19AB6}" type="datetimeFigureOut">
               <a:rPr lang="pt-BR" smtClean="0"/>
-              <a:t>22/01/2020</a:t>
+              <a:t>05/03/2020</a:t>
             </a:fld>
             <a:endParaRPr lang="pt-BR"/>
           </a:p>
@@ -1915,7 +1915,7 @@
           <a:p>
             <a:fld id="{1BC5D9AF-0A3A-46C6-9823-3468E6F7B9BB}" type="slidenum">
               <a:rPr lang="pt-BR" smtClean="0"/>
-              <a:t>‹nº›</a:t>
+              <a:t>‹#›</a:t>
             </a:fld>
             <a:endParaRPr lang="pt-BR"/>
           </a:p>
@@ -2113,7 +2113,7 @@
               <a:pPr>
                 <a:defRPr/>
               </a:pPr>
-              <a:t>‹nº›</a:t>
+              <a:t>‹#›</a:t>
             </a:fld>
             <a:endParaRPr lang="pt-BR"/>
           </a:p>
@@ -2263,7 +2263,7 @@
           <a:p>
             <a:fld id="{89C4B140-6DEB-45EB-A5FE-2FE213A19AB6}" type="datetimeFigureOut">
               <a:rPr lang="pt-BR" smtClean="0"/>
-              <a:t>22/01/2020</a:t>
+              <a:t>05/03/2020</a:t>
             </a:fld>
             <a:endParaRPr lang="pt-BR"/>
           </a:p>
@@ -2321,7 +2321,7 @@
           <a:p>
             <a:fld id="{1BC5D9AF-0A3A-46C6-9823-3468E6F7B9BB}" type="slidenum">
               <a:rPr lang="pt-BR" smtClean="0"/>
-              <a:t>‹nº›</a:t>
+              <a:t>‹#›</a:t>
             </a:fld>
             <a:endParaRPr lang="pt-BR"/>
           </a:p>
@@ -2538,7 +2538,7 @@
           <a:p>
             <a:fld id="{89C4B140-6DEB-45EB-A5FE-2FE213A19AB6}" type="datetimeFigureOut">
               <a:rPr lang="pt-BR" smtClean="0"/>
-              <a:t>22/01/2020</a:t>
+              <a:t>05/03/2020</a:t>
             </a:fld>
             <a:endParaRPr lang="pt-BR"/>
           </a:p>
@@ -2596,7 +2596,7 @@
           <a:p>
             <a:fld id="{1BC5D9AF-0A3A-46C6-9823-3468E6F7B9BB}" type="slidenum">
               <a:rPr lang="pt-BR" smtClean="0"/>
-              <a:t>‹nº›</a:t>
+              <a:t>‹#›</a:t>
             </a:fld>
             <a:endParaRPr lang="pt-BR"/>
           </a:p>
@@ -2861,7 +2861,7 @@
           <a:p>
             <a:fld id="{89C4B140-6DEB-45EB-A5FE-2FE213A19AB6}" type="datetimeFigureOut">
               <a:rPr lang="pt-BR" smtClean="0"/>
-              <a:t>22/01/2020</a:t>
+              <a:t>05/03/2020</a:t>
             </a:fld>
             <a:endParaRPr lang="pt-BR"/>
           </a:p>
@@ -2919,7 +2919,7 @@
           <a:p>
             <a:fld id="{1BC5D9AF-0A3A-46C6-9823-3468E6F7B9BB}" type="slidenum">
               <a:rPr lang="pt-BR" smtClean="0"/>
-              <a:t>‹nº›</a:t>
+              <a:t>‹#›</a:t>
             </a:fld>
             <a:endParaRPr lang="pt-BR"/>
           </a:p>
@@ -3324,7 +3324,7 @@
           <a:p>
             <a:fld id="{89C4B140-6DEB-45EB-A5FE-2FE213A19AB6}" type="datetimeFigureOut">
               <a:rPr lang="pt-BR" smtClean="0"/>
-              <a:t>22/01/2020</a:t>
+              <a:t>05/03/2020</a:t>
             </a:fld>
             <a:endParaRPr lang="pt-BR"/>
           </a:p>
@@ -3382,7 +3382,7 @@
           <a:p>
             <a:fld id="{1BC5D9AF-0A3A-46C6-9823-3468E6F7B9BB}" type="slidenum">
               <a:rPr lang="pt-BR" smtClean="0"/>
-              <a:t>‹nº›</a:t>
+              <a:t>‹#›</a:t>
             </a:fld>
             <a:endParaRPr lang="pt-BR"/>
           </a:p>
@@ -3473,7 +3473,7 @@
           <a:p>
             <a:fld id="{89C4B140-6DEB-45EB-A5FE-2FE213A19AB6}" type="datetimeFigureOut">
               <a:rPr lang="pt-BR" smtClean="0"/>
-              <a:t>22/01/2020</a:t>
+              <a:t>05/03/2020</a:t>
             </a:fld>
             <a:endParaRPr lang="pt-BR"/>
           </a:p>
@@ -3531,7 +3531,7 @@
           <a:p>
             <a:fld id="{1BC5D9AF-0A3A-46C6-9823-3468E6F7B9BB}" type="slidenum">
               <a:rPr lang="pt-BR" smtClean="0"/>
-              <a:t>‹nº›</a:t>
+              <a:t>‹#›</a:t>
             </a:fld>
             <a:endParaRPr lang="pt-BR"/>
           </a:p>
@@ -3592,7 +3592,7 @@
           <a:p>
             <a:fld id="{89C4B140-6DEB-45EB-A5FE-2FE213A19AB6}" type="datetimeFigureOut">
               <a:rPr lang="pt-BR" smtClean="0"/>
-              <a:t>22/01/2020</a:t>
+              <a:t>05/03/2020</a:t>
             </a:fld>
             <a:endParaRPr lang="pt-BR"/>
           </a:p>
@@ -3650,7 +3650,7 @@
           <a:p>
             <a:fld id="{1BC5D9AF-0A3A-46C6-9823-3468E6F7B9BB}" type="slidenum">
               <a:rPr lang="pt-BR" smtClean="0"/>
-              <a:t>‹nº›</a:t>
+              <a:t>‹#›</a:t>
             </a:fld>
             <a:endParaRPr lang="pt-BR"/>
           </a:p>
@@ -3900,7 +3900,7 @@
           <a:p>
             <a:fld id="{89C4B140-6DEB-45EB-A5FE-2FE213A19AB6}" type="datetimeFigureOut">
               <a:rPr lang="pt-BR" smtClean="0"/>
-              <a:t>22/01/2020</a:t>
+              <a:t>05/03/2020</a:t>
             </a:fld>
             <a:endParaRPr lang="pt-BR"/>
           </a:p>
@@ -3958,7 +3958,7 @@
           <a:p>
             <a:fld id="{1BC5D9AF-0A3A-46C6-9823-3468E6F7B9BB}" type="slidenum">
               <a:rPr lang="pt-BR" smtClean="0"/>
-              <a:t>‹nº›</a:t>
+              <a:t>‹#›</a:t>
             </a:fld>
             <a:endParaRPr lang="pt-BR"/>
           </a:p>
@@ -4185,7 +4185,7 @@
           <a:p>
             <a:fld id="{89C4B140-6DEB-45EB-A5FE-2FE213A19AB6}" type="datetimeFigureOut">
               <a:rPr lang="pt-BR" smtClean="0"/>
-              <a:t>22/01/2020</a:t>
+              <a:t>05/03/2020</a:t>
             </a:fld>
             <a:endParaRPr lang="pt-BR"/>
           </a:p>
@@ -4243,7 +4243,7 @@
           <a:p>
             <a:fld id="{1BC5D9AF-0A3A-46C6-9823-3468E6F7B9BB}" type="slidenum">
               <a:rPr lang="pt-BR" smtClean="0"/>
-              <a:t>‹nº›</a:t>
+              <a:t>‹#›</a:t>
             </a:fld>
             <a:endParaRPr lang="pt-BR"/>
           </a:p>
@@ -5072,8 +5072,8 @@
         </p:nvSpPr>
         <p:spPr>
           <a:xfrm>
-            <a:off x="735997" y="1052736"/>
-            <a:ext cx="7469161" cy="923330"/>
+            <a:off x="2483768" y="1144711"/>
+            <a:ext cx="4536504" cy="923330"/>
           </a:xfrm>
           <a:prstGeom prst="rect">
             <a:avLst/>
@@ -5083,7 +5083,7 @@
           </a:solidFill>
         </p:spPr>
         <p:txBody>
-          <a:bodyPr wrap="none" rtlCol="0">
+          <a:bodyPr wrap="square" rtlCol="0">
             <a:spAutoFit/>
           </a:bodyPr>
           <a:lstStyle/>
@@ -5096,15 +5096,15 @@
             </a:r>
             <a:r>
               <a:rPr lang="it-IT" b="1" dirty="0"/>
-              <a:t>PROJETO DE SISTEMAS APLICADO AS MELHORES PRÁTICAS EM </a:t>
-            </a:r>
-          </a:p>
-          <a:p>
-            <a:r>
-              <a:rPr lang="it-IT" b="1" dirty="0"/>
-              <a:t>QUALIDADE DE SOFTWARE E GOVERNANÇA DE TI</a:t>
-            </a:r>
-            <a:endParaRPr lang="pt-BR" b="1"/>
+              <a:t>P</a:t>
+            </a:r>
+            <a:r>
+              <a:rPr lang="pt-BR" b="1" dirty="0"/>
+              <a:t>ENIS GIGANTESCO</a:t>
+            </a:r>
+          </a:p>
+          <a:p>
+            <a:endParaRPr lang="pt-BR" b="1" dirty="0"/>
           </a:p>
           <a:p>
             <a:endParaRPr lang="pt-BR" b="1" dirty="0"/>

</xml_diff>